<commit_message>
updated DNS resolution diagrams
</commit_message>
<xml_diff>
--- a/diagrams/Diagram GSLB resolution.pptx
+++ b/diagrams/Diagram GSLB resolution.pptx
@@ -197,7 +197,7 @@
           <a:p>
             <a:fld id="{4751AC86-D70E-BE47-B993-E1D2D5CB79C5}" type="datetimeFigureOut">
               <a:rPr lang="en-ES" smtClean="0"/>
-              <a:t>30/04/2020</a:t>
+              <a:t>01/05/2020</a:t>
             </a:fld>
             <a:endParaRPr lang="en-ES"/>
           </a:p>
@@ -596,7 +596,7 @@
           <a:p>
             <a:fld id="{FC3229FA-B3EE-C348-938C-25A116702558}" type="datetimeFigureOut">
               <a:rPr lang="en-ES" smtClean="0"/>
-              <a:t>30/04/2020</a:t>
+              <a:t>01/05/2020</a:t>
             </a:fld>
             <a:endParaRPr lang="en-ES"/>
           </a:p>
@@ -766,7 +766,7 @@
           <a:p>
             <a:fld id="{FC3229FA-B3EE-C348-938C-25A116702558}" type="datetimeFigureOut">
               <a:rPr lang="en-ES" smtClean="0"/>
-              <a:t>30/04/2020</a:t>
+              <a:t>01/05/2020</a:t>
             </a:fld>
             <a:endParaRPr lang="en-ES"/>
           </a:p>
@@ -946,7 +946,7 @@
           <a:p>
             <a:fld id="{FC3229FA-B3EE-C348-938C-25A116702558}" type="datetimeFigureOut">
               <a:rPr lang="en-ES" smtClean="0"/>
-              <a:t>30/04/2020</a:t>
+              <a:t>01/05/2020</a:t>
             </a:fld>
             <a:endParaRPr lang="en-ES"/>
           </a:p>
@@ -1116,7 +1116,7 @@
           <a:p>
             <a:fld id="{FC3229FA-B3EE-C348-938C-25A116702558}" type="datetimeFigureOut">
               <a:rPr lang="en-ES" smtClean="0"/>
-              <a:t>30/04/2020</a:t>
+              <a:t>01/05/2020</a:t>
             </a:fld>
             <a:endParaRPr lang="en-ES"/>
           </a:p>
@@ -1362,7 +1362,7 @@
           <a:p>
             <a:fld id="{FC3229FA-B3EE-C348-938C-25A116702558}" type="datetimeFigureOut">
               <a:rPr lang="en-ES" smtClean="0"/>
-              <a:t>30/04/2020</a:t>
+              <a:t>01/05/2020</a:t>
             </a:fld>
             <a:endParaRPr lang="en-ES"/>
           </a:p>
@@ -1594,7 +1594,7 @@
           <a:p>
             <a:fld id="{FC3229FA-B3EE-C348-938C-25A116702558}" type="datetimeFigureOut">
               <a:rPr lang="en-ES" smtClean="0"/>
-              <a:t>30/04/2020</a:t>
+              <a:t>01/05/2020</a:t>
             </a:fld>
             <a:endParaRPr lang="en-ES"/>
           </a:p>
@@ -1961,7 +1961,7 @@
           <a:p>
             <a:fld id="{FC3229FA-B3EE-C348-938C-25A116702558}" type="datetimeFigureOut">
               <a:rPr lang="en-ES" smtClean="0"/>
-              <a:t>30/04/2020</a:t>
+              <a:t>01/05/2020</a:t>
             </a:fld>
             <a:endParaRPr lang="en-ES"/>
           </a:p>
@@ -2079,7 +2079,7 @@
           <a:p>
             <a:fld id="{FC3229FA-B3EE-C348-938C-25A116702558}" type="datetimeFigureOut">
               <a:rPr lang="en-ES" smtClean="0"/>
-              <a:t>30/04/2020</a:t>
+              <a:t>01/05/2020</a:t>
             </a:fld>
             <a:endParaRPr lang="en-ES"/>
           </a:p>
@@ -2174,7 +2174,7 @@
           <a:p>
             <a:fld id="{FC3229FA-B3EE-C348-938C-25A116702558}" type="datetimeFigureOut">
               <a:rPr lang="en-ES" smtClean="0"/>
-              <a:t>30/04/2020</a:t>
+              <a:t>01/05/2020</a:t>
             </a:fld>
             <a:endParaRPr lang="en-ES"/>
           </a:p>
@@ -2451,7 +2451,7 @@
           <a:p>
             <a:fld id="{FC3229FA-B3EE-C348-938C-25A116702558}" type="datetimeFigureOut">
               <a:rPr lang="en-ES" smtClean="0"/>
-              <a:t>30/04/2020</a:t>
+              <a:t>01/05/2020</a:t>
             </a:fld>
             <a:endParaRPr lang="en-ES"/>
           </a:p>
@@ -2708,7 +2708,7 @@
           <a:p>
             <a:fld id="{FC3229FA-B3EE-C348-938C-25A116702558}" type="datetimeFigureOut">
               <a:rPr lang="en-ES" smtClean="0"/>
-              <a:t>30/04/2020</a:t>
+              <a:t>01/05/2020</a:t>
             </a:fld>
             <a:endParaRPr lang="en-ES"/>
           </a:p>
@@ -2921,7 +2921,7 @@
           <a:p>
             <a:fld id="{FC3229FA-B3EE-C348-938C-25A116702558}" type="datetimeFigureOut">
               <a:rPr lang="en-ES" smtClean="0"/>
-              <a:t>30/04/2020</a:t>
+              <a:t>01/05/2020</a:t>
             </a:fld>
             <a:endParaRPr lang="en-ES"/>
           </a:p>
@@ -3364,114 +3364,6 @@
       </p:pic>
       <p:sp>
         <p:nvSpPr>
-          <p:cNvPr id="15" name="Right Arrow 14">
-            <a:extLst>
-              <a:ext uri="{FF2B5EF4-FFF2-40B4-BE49-F238E27FC236}">
-                <a16:creationId xmlns:a16="http://schemas.microsoft.com/office/drawing/2014/main" id="{D7FD5239-51DD-EE4E-A888-7ADFFE14D1B7}"/>
-              </a:ext>
-            </a:extLst>
-          </p:cNvPr>
-          <p:cNvSpPr/>
-          <p:nvPr/>
-        </p:nvSpPr>
-        <p:spPr>
-          <a:xfrm>
-            <a:off x="1754290" y="2072753"/>
-            <a:ext cx="884420" cy="614597"/>
-          </a:xfrm>
-          <a:prstGeom prst="rightArrow">
-            <a:avLst/>
-          </a:prstGeom>
-          <a:solidFill>
-            <a:srgbClr val="FFFF00"/>
-          </a:solidFill>
-        </p:spPr>
-        <p:style>
-          <a:lnRef idx="2">
-            <a:schemeClr val="accent1">
-              <a:shade val="50000"/>
-            </a:schemeClr>
-          </a:lnRef>
-          <a:fillRef idx="1">
-            <a:schemeClr val="accent1"/>
-          </a:fillRef>
-          <a:effectRef idx="0">
-            <a:schemeClr val="accent1"/>
-          </a:effectRef>
-          <a:fontRef idx="minor">
-            <a:schemeClr val="lt1"/>
-          </a:fontRef>
-        </p:style>
-        <p:txBody>
-          <a:bodyPr rot="0" spcFirstLastPara="0" vertOverflow="overflow" horzOverflow="overflow" vert="horz" wrap="square" lIns="91440" tIns="45720" rIns="91440" bIns="45720" numCol="1" spcCol="0" rtlCol="0" fromWordArt="0" anchor="ctr" anchorCtr="0" forceAA="0" compatLnSpc="1">
-            <a:prstTxWarp prst="textNoShape">
-              <a:avLst/>
-            </a:prstTxWarp>
-            <a:noAutofit/>
-          </a:bodyPr>
-          <a:lstStyle/>
-          <a:p>
-            <a:pPr algn="ctr"/>
-            <a:endParaRPr lang="en-ES"/>
-          </a:p>
-        </p:txBody>
-      </p:sp>
-      <p:sp>
-        <p:nvSpPr>
-          <p:cNvPr id="16" name="Right Arrow 15">
-            <a:extLst>
-              <a:ext uri="{FF2B5EF4-FFF2-40B4-BE49-F238E27FC236}">
-                <a16:creationId xmlns:a16="http://schemas.microsoft.com/office/drawing/2014/main" id="{E2B2E927-5CB1-6A48-BA4C-E10EA46CBE5F}"/>
-              </a:ext>
-            </a:extLst>
-          </p:cNvPr>
-          <p:cNvSpPr/>
-          <p:nvPr/>
-        </p:nvSpPr>
-        <p:spPr>
-          <a:xfrm>
-            <a:off x="6916735" y="2072753"/>
-            <a:ext cx="884420" cy="614597"/>
-          </a:xfrm>
-          <a:prstGeom prst="rightArrow">
-            <a:avLst/>
-          </a:prstGeom>
-          <a:solidFill>
-            <a:srgbClr val="FFFF00"/>
-          </a:solidFill>
-        </p:spPr>
-        <p:style>
-          <a:lnRef idx="2">
-            <a:schemeClr val="accent1">
-              <a:shade val="50000"/>
-            </a:schemeClr>
-          </a:lnRef>
-          <a:fillRef idx="1">
-            <a:schemeClr val="accent1"/>
-          </a:fillRef>
-          <a:effectRef idx="0">
-            <a:schemeClr val="accent1"/>
-          </a:effectRef>
-          <a:fontRef idx="minor">
-            <a:schemeClr val="lt1"/>
-          </a:fontRef>
-        </p:style>
-        <p:txBody>
-          <a:bodyPr rot="0" spcFirstLastPara="0" vertOverflow="overflow" horzOverflow="overflow" vert="horz" wrap="square" lIns="91440" tIns="45720" rIns="91440" bIns="45720" numCol="1" spcCol="0" rtlCol="0" fromWordArt="0" anchor="ctr" anchorCtr="0" forceAA="0" compatLnSpc="1">
-            <a:prstTxWarp prst="textNoShape">
-              <a:avLst/>
-            </a:prstTxWarp>
-            <a:noAutofit/>
-          </a:bodyPr>
-          <a:lstStyle/>
-          <a:p>
-            <a:pPr algn="ctr"/>
-            <a:endParaRPr lang="en-ES"/>
-          </a:p>
-        </p:txBody>
-      </p:sp>
-      <p:sp>
-        <p:nvSpPr>
           <p:cNvPr id="17" name="Snip Single Corner of Rectangle 16">
             <a:extLst>
               <a:ext uri="{FF2B5EF4-FFF2-40B4-BE49-F238E27FC236}">
@@ -3519,7 +3411,7 @@
             <a:pPr algn="ctr"/>
             <a:r>
               <a:rPr lang="en-ES" dirty="0"/>
-              <a:t>www.apps.</a:t>
+              <a:t>www.</a:t>
             </a:r>
             <a:r>
               <a:rPr lang="en-ES" dirty="0">
@@ -3763,7 +3655,7 @@
             <a:pPr algn="ctr"/>
             <a:r>
               <a:rPr lang="en-ES" dirty="0"/>
-              <a:t>Cluster’s router IP address</a:t>
+              <a:t>Router public IP address</a:t>
             </a:r>
           </a:p>
         </p:txBody>
@@ -3949,6 +3841,114 @@
               <a:rPr lang="en-ES" b="1" dirty="0"/>
               <a:t>F5 Cloud Services DNS LB</a:t>
             </a:r>
+          </a:p>
+        </p:txBody>
+      </p:sp>
+      <p:sp>
+        <p:nvSpPr>
+          <p:cNvPr id="15" name="Right Arrow 14">
+            <a:extLst>
+              <a:ext uri="{FF2B5EF4-FFF2-40B4-BE49-F238E27FC236}">
+                <a16:creationId xmlns:a16="http://schemas.microsoft.com/office/drawing/2014/main" id="{D7FD5239-51DD-EE4E-A888-7ADFFE14D1B7}"/>
+              </a:ext>
+            </a:extLst>
+          </p:cNvPr>
+          <p:cNvSpPr/>
+          <p:nvPr/>
+        </p:nvSpPr>
+        <p:spPr>
+          <a:xfrm>
+            <a:off x="1754290" y="2072753"/>
+            <a:ext cx="884420" cy="614597"/>
+          </a:xfrm>
+          <a:prstGeom prst="rightArrow">
+            <a:avLst/>
+          </a:prstGeom>
+          <a:solidFill>
+            <a:srgbClr val="FFFF00"/>
+          </a:solidFill>
+        </p:spPr>
+        <p:style>
+          <a:lnRef idx="2">
+            <a:schemeClr val="accent1">
+              <a:shade val="50000"/>
+            </a:schemeClr>
+          </a:lnRef>
+          <a:fillRef idx="1">
+            <a:schemeClr val="accent1"/>
+          </a:fillRef>
+          <a:effectRef idx="0">
+            <a:schemeClr val="accent1"/>
+          </a:effectRef>
+          <a:fontRef idx="minor">
+            <a:schemeClr val="lt1"/>
+          </a:fontRef>
+        </p:style>
+        <p:txBody>
+          <a:bodyPr rot="0" spcFirstLastPara="0" vertOverflow="overflow" horzOverflow="overflow" vert="horz" wrap="square" lIns="91440" tIns="45720" rIns="91440" bIns="45720" numCol="1" spcCol="0" rtlCol="0" fromWordArt="0" anchor="ctr" anchorCtr="0" forceAA="0" compatLnSpc="1">
+            <a:prstTxWarp prst="textNoShape">
+              <a:avLst/>
+            </a:prstTxWarp>
+            <a:noAutofit/>
+          </a:bodyPr>
+          <a:lstStyle/>
+          <a:p>
+            <a:pPr algn="ctr"/>
+            <a:endParaRPr lang="en-ES"/>
+          </a:p>
+        </p:txBody>
+      </p:sp>
+      <p:sp>
+        <p:nvSpPr>
+          <p:cNvPr id="16" name="Right Arrow 15">
+            <a:extLst>
+              <a:ext uri="{FF2B5EF4-FFF2-40B4-BE49-F238E27FC236}">
+                <a16:creationId xmlns:a16="http://schemas.microsoft.com/office/drawing/2014/main" id="{E2B2E927-5CB1-6A48-BA4C-E10EA46CBE5F}"/>
+              </a:ext>
+            </a:extLst>
+          </p:cNvPr>
+          <p:cNvSpPr/>
+          <p:nvPr/>
+        </p:nvSpPr>
+        <p:spPr>
+          <a:xfrm>
+            <a:off x="6916735" y="2072753"/>
+            <a:ext cx="884420" cy="614597"/>
+          </a:xfrm>
+          <a:prstGeom prst="rightArrow">
+            <a:avLst/>
+          </a:prstGeom>
+          <a:solidFill>
+            <a:srgbClr val="FFFF00"/>
+          </a:solidFill>
+        </p:spPr>
+        <p:style>
+          <a:lnRef idx="2">
+            <a:schemeClr val="accent1">
+              <a:shade val="50000"/>
+            </a:schemeClr>
+          </a:lnRef>
+          <a:fillRef idx="1">
+            <a:schemeClr val="accent1"/>
+          </a:fillRef>
+          <a:effectRef idx="0">
+            <a:schemeClr val="accent1"/>
+          </a:effectRef>
+          <a:fontRef idx="minor">
+            <a:schemeClr val="lt1"/>
+          </a:fontRef>
+        </p:style>
+        <p:txBody>
+          <a:bodyPr rot="0" spcFirstLastPara="0" vertOverflow="overflow" horzOverflow="overflow" vert="horz" wrap="square" lIns="91440" tIns="45720" rIns="91440" bIns="45720" numCol="1" spcCol="0" rtlCol="0" fromWordArt="0" anchor="ctr" anchorCtr="0" forceAA="0" compatLnSpc="1">
+            <a:prstTxWarp prst="textNoShape">
+              <a:avLst/>
+            </a:prstTxWarp>
+            <a:noAutofit/>
+          </a:bodyPr>
+          <a:lstStyle/>
+          <a:p>
+            <a:pPr algn="ctr"/>
+            <a:endParaRPr lang="en-ES"/>
           </a:p>
         </p:txBody>
       </p:sp>

</xml_diff>

<commit_message>
Updated letter size of DNS resolution diagrams
</commit_message>
<xml_diff>
--- a/diagrams/Diagram GSLB resolution.pptx
+++ b/diagrams/Diagram GSLB resolution.pptx
@@ -3410,11 +3410,11 @@
           <a:p>
             <a:pPr algn="ctr"/>
             <a:r>
-              <a:rPr lang="en-ES" dirty="0"/>
+              <a:rPr lang="en-ES" sz="2400" dirty="0"/>
               <a:t>www.</a:t>
             </a:r>
             <a:r>
-              <a:rPr lang="en-ES" dirty="0">
+              <a:rPr lang="en-ES" sz="2400" dirty="0">
                 <a:solidFill>
                   <a:schemeClr val="tx1"/>
                 </a:solidFill>
@@ -3422,7 +3422,7 @@
               <a:t>gslb</a:t>
             </a:r>
             <a:r>
-              <a:rPr lang="en-ES" dirty="0"/>
+              <a:rPr lang="en-ES" sz="2400" dirty="0"/>
               <a:t>.mycompany.com</a:t>
             </a:r>
           </a:p>
@@ -3443,7 +3443,7 @@
         <p:spPr>
           <a:xfrm>
             <a:off x="3852918" y="3721669"/>
-            <a:ext cx="1561581" cy="369332"/>
+            <a:ext cx="2018886" cy="461665"/>
           </a:xfrm>
           <a:prstGeom prst="rect">
             <a:avLst/>
@@ -3457,7 +3457,7 @@
           <a:lstStyle/>
           <a:p>
             <a:r>
-              <a:rPr lang="en-ES" dirty="0"/>
+              <a:rPr lang="en-ES" sz="2400" dirty="0"/>
               <a:t>CNAME record</a:t>
             </a:r>
           </a:p>
@@ -3478,7 +3478,7 @@
         <p:spPr>
           <a:xfrm>
             <a:off x="9401752" y="3721669"/>
-            <a:ext cx="979692" cy="369332"/>
+            <a:ext cx="1243033" cy="461665"/>
           </a:xfrm>
           <a:prstGeom prst="rect">
             <a:avLst/>
@@ -3492,7 +3492,7 @@
           <a:lstStyle/>
           <a:p>
             <a:r>
-              <a:rPr lang="en-ES" dirty="0"/>
+              <a:rPr lang="en-ES" sz="2400" dirty="0"/>
               <a:t>A record</a:t>
             </a:r>
           </a:p>
@@ -3546,7 +3546,7 @@
           <a:p>
             <a:pPr algn="ctr"/>
             <a:r>
-              <a:rPr lang="en-ES" dirty="0"/>
+              <a:rPr lang="en-ES" sz="2400" dirty="0"/>
               <a:t>www.mycompany.com</a:t>
             </a:r>
           </a:p>
@@ -3602,7 +3602,7 @@
           <a:lstStyle/>
           <a:p>
             <a:pPr algn="ctr"/>
-            <a:endParaRPr lang="en-ES"/>
+            <a:endParaRPr lang="en-ES" sz="2400"/>
           </a:p>
         </p:txBody>
       </p:sp>
@@ -3654,7 +3654,7 @@
           <a:p>
             <a:pPr algn="ctr"/>
             <a:r>
-              <a:rPr lang="en-ES" dirty="0"/>
+              <a:rPr lang="en-ES" sz="2400" dirty="0"/>
               <a:t>Router public IP address</a:t>
             </a:r>
           </a:p>
@@ -3713,7 +3713,7 @@
           <a:lstStyle/>
           <a:p>
             <a:pPr algn="ctr"/>
-            <a:endParaRPr lang="en-ES"/>
+            <a:endParaRPr lang="en-ES" sz="2400"/>
           </a:p>
         </p:txBody>
       </p:sp>
@@ -3732,7 +3732,7 @@
         <p:spPr>
           <a:xfrm>
             <a:off x="3404236" y="722339"/>
-            <a:ext cx="2458943" cy="369332"/>
+            <a:ext cx="3220177" cy="461665"/>
           </a:xfrm>
           <a:prstGeom prst="rect">
             <a:avLst/>
@@ -3746,7 +3746,7 @@
           <a:lstStyle/>
           <a:p>
             <a:r>
-              <a:rPr lang="en-ES" b="1" dirty="0"/>
+              <a:rPr lang="en-ES" sz="2400" b="1" dirty="0"/>
               <a:t>Corporate or Cloud DNS</a:t>
             </a:r>
           </a:p>
@@ -3805,7 +3805,7 @@
           <a:lstStyle/>
           <a:p>
             <a:pPr algn="ctr"/>
-            <a:endParaRPr lang="en-ES"/>
+            <a:endParaRPr lang="en-ES" sz="2400"/>
           </a:p>
         </p:txBody>
       </p:sp>
@@ -3824,7 +3824,7 @@
         <p:spPr>
           <a:xfrm>
             <a:off x="11264046" y="722339"/>
-            <a:ext cx="2578398" cy="369332"/>
+            <a:ext cx="3377335" cy="461665"/>
           </a:xfrm>
           <a:prstGeom prst="rect">
             <a:avLst/>
@@ -3838,7 +3838,7 @@
           <a:lstStyle/>
           <a:p>
             <a:r>
-              <a:rPr lang="en-ES" b="1" dirty="0"/>
+              <a:rPr lang="en-ES" sz="2400" b="1" dirty="0"/>
               <a:t>F5 Cloud Services DNS LB</a:t>
             </a:r>
           </a:p>
@@ -3894,7 +3894,7 @@
           <a:lstStyle/>
           <a:p>
             <a:pPr algn="ctr"/>
-            <a:endParaRPr lang="en-ES"/>
+            <a:endParaRPr lang="en-ES" sz="2400"/>
           </a:p>
         </p:txBody>
       </p:sp>
@@ -3948,7 +3948,7 @@
           <a:lstStyle/>
           <a:p>
             <a:pPr algn="ctr"/>
-            <a:endParaRPr lang="en-ES"/>
+            <a:endParaRPr lang="en-ES" sz="2400"/>
           </a:p>
         </p:txBody>
       </p:sp>

</xml_diff>